<commit_message>
updating figures for revised ms, splitting previous Fig 2 into separte figs
</commit_message>
<xml_diff>
--- a/output/plots/paper_plots/sampling_effort_analysis_with_line.pptx
+++ b/output/plots/paper_plots/sampling_effort_analysis_with_line.pptx
@@ -106,7 +106,18 @@
   </p:defaultTextStyle>
   <p:extLst>
     <p:ext uri="{EFAFB233-063F-42B5-8137-9DF3F51BA10A}">
-      <p15:sldGuideLst xmlns:p15="http://schemas.microsoft.com/office/powerpoint/2012/main"/>
+      <p15:sldGuideLst xmlns:p15="http://schemas.microsoft.com/office/powerpoint/2012/main">
+        <p15:guide id="1" orient="horz" pos="2160" userDrawn="1">
+          <p15:clr>
+            <a:srgbClr val="A4A3A4"/>
+          </p15:clr>
+        </p15:guide>
+        <p15:guide id="2" pos="2880" userDrawn="1">
+          <p15:clr>
+            <a:srgbClr val="A4A3A4"/>
+          </p15:clr>
+        </p15:guide>
+      </p15:sldGuideLst>
     </p:ext>
   </p:extLst>
 </p:presentation>
@@ -243,7 +254,7 @@
           <a:p>
             <a:fld id="{4029C070-8D66-43F3-9182-A6BE622E7BCB}" type="datetimeFigureOut">
               <a:rPr lang="en-US" smtClean="0"/>
-              <a:t>1/25/2018</a:t>
+              <a:t>7/20/2018</a:t>
             </a:fld>
             <a:endParaRPr lang="en-US"/>
           </a:p>
@@ -413,7 +424,7 @@
           <a:p>
             <a:fld id="{4029C070-8D66-43F3-9182-A6BE622E7BCB}" type="datetimeFigureOut">
               <a:rPr lang="en-US" smtClean="0"/>
-              <a:t>1/25/2018</a:t>
+              <a:t>7/20/2018</a:t>
             </a:fld>
             <a:endParaRPr lang="en-US"/>
           </a:p>
@@ -593,7 +604,7 @@
           <a:p>
             <a:fld id="{4029C070-8D66-43F3-9182-A6BE622E7BCB}" type="datetimeFigureOut">
               <a:rPr lang="en-US" smtClean="0"/>
-              <a:t>1/25/2018</a:t>
+              <a:t>7/20/2018</a:t>
             </a:fld>
             <a:endParaRPr lang="en-US"/>
           </a:p>
@@ -763,7 +774,7 @@
           <a:p>
             <a:fld id="{4029C070-8D66-43F3-9182-A6BE622E7BCB}" type="datetimeFigureOut">
               <a:rPr lang="en-US" smtClean="0"/>
-              <a:t>1/25/2018</a:t>
+              <a:t>7/20/2018</a:t>
             </a:fld>
             <a:endParaRPr lang="en-US"/>
           </a:p>
@@ -1007,7 +1018,7 @@
           <a:p>
             <a:fld id="{4029C070-8D66-43F3-9182-A6BE622E7BCB}" type="datetimeFigureOut">
               <a:rPr lang="en-US" smtClean="0"/>
-              <a:t>1/25/2018</a:t>
+              <a:t>7/20/2018</a:t>
             </a:fld>
             <a:endParaRPr lang="en-US"/>
           </a:p>
@@ -1239,7 +1250,7 @@
           <a:p>
             <a:fld id="{4029C070-8D66-43F3-9182-A6BE622E7BCB}" type="datetimeFigureOut">
               <a:rPr lang="en-US" smtClean="0"/>
-              <a:t>1/25/2018</a:t>
+              <a:t>7/20/2018</a:t>
             </a:fld>
             <a:endParaRPr lang="en-US"/>
           </a:p>
@@ -1606,7 +1617,7 @@
           <a:p>
             <a:fld id="{4029C070-8D66-43F3-9182-A6BE622E7BCB}" type="datetimeFigureOut">
               <a:rPr lang="en-US" smtClean="0"/>
-              <a:t>1/25/2018</a:t>
+              <a:t>7/20/2018</a:t>
             </a:fld>
             <a:endParaRPr lang="en-US"/>
           </a:p>
@@ -1724,7 +1735,7 @@
           <a:p>
             <a:fld id="{4029C070-8D66-43F3-9182-A6BE622E7BCB}" type="datetimeFigureOut">
               <a:rPr lang="en-US" smtClean="0"/>
-              <a:t>1/25/2018</a:t>
+              <a:t>7/20/2018</a:t>
             </a:fld>
             <a:endParaRPr lang="en-US"/>
           </a:p>
@@ -1819,7 +1830,7 @@
           <a:p>
             <a:fld id="{4029C070-8D66-43F3-9182-A6BE622E7BCB}" type="datetimeFigureOut">
               <a:rPr lang="en-US" smtClean="0"/>
-              <a:t>1/25/2018</a:t>
+              <a:t>7/20/2018</a:t>
             </a:fld>
             <a:endParaRPr lang="en-US"/>
           </a:p>
@@ -2096,7 +2107,7 @@
           <a:p>
             <a:fld id="{4029C070-8D66-43F3-9182-A6BE622E7BCB}" type="datetimeFigureOut">
               <a:rPr lang="en-US" smtClean="0"/>
-              <a:t>1/25/2018</a:t>
+              <a:t>7/20/2018</a:t>
             </a:fld>
             <a:endParaRPr lang="en-US"/>
           </a:p>
@@ -2353,7 +2364,7 @@
           <a:p>
             <a:fld id="{4029C070-8D66-43F3-9182-A6BE622E7BCB}" type="datetimeFigureOut">
               <a:rPr lang="en-US" smtClean="0"/>
-              <a:t>1/25/2018</a:t>
+              <a:t>7/20/2018</a:t>
             </a:fld>
             <a:endParaRPr lang="en-US"/>
           </a:p>
@@ -2566,7 +2577,7 @@
           <a:p>
             <a:fld id="{4029C070-8D66-43F3-9182-A6BE622E7BCB}" type="datetimeFigureOut">
               <a:rPr lang="en-US" smtClean="0"/>
-              <a:t>1/25/2018</a:t>
+              <a:t>7/20/2018</a:t>
             </a:fld>
             <a:endParaRPr lang="en-US"/>
           </a:p>
@@ -2971,60 +2982,38 @@
           <a:chExt cx="0" cy="0"/>
         </a:xfrm>
       </p:grpSpPr>
-      <p:pic>
-        <p:nvPicPr>
-          <p:cNvPr id="4" name="Picture 3"/>
-          <p:cNvPicPr>
-            <a:picLocks noChangeAspect="1"/>
-          </p:cNvPicPr>
+      <p:sp>
+        <p:nvSpPr>
+          <p:cNvPr id="8" name="Freeform 7"/>
+          <p:cNvSpPr/>
           <p:nvPr/>
-        </p:nvPicPr>
-        <p:blipFill>
-          <a:blip r:embed="rId2"/>
-          <a:stretch>
-            <a:fillRect/>
-          </a:stretch>
-        </p:blipFill>
+        </p:nvSpPr>
         <p:spPr>
           <a:xfrm>
-            <a:off x="590204" y="104451"/>
-            <a:ext cx="7913716" cy="6684930"/>
-          </a:xfrm>
-          <a:prstGeom prst="rect">
-            <a:avLst/>
-          </a:prstGeom>
-        </p:spPr>
-      </p:pic>
-      <p:sp>
-        <p:nvSpPr>
-          <p:cNvPr id="5" name="Freeform 4"/>
-          <p:cNvSpPr/>
-          <p:nvPr/>
-        </p:nvSpPr>
-        <p:spPr>
-          <a:xfrm>
-            <a:off x="1253886" y="598516"/>
-            <a:ext cx="4407081" cy="4795169"/>
+            <a:off x="1376624" y="864158"/>
+            <a:ext cx="4290646" cy="4466493"/>
           </a:xfrm>
           <a:custGeom>
             <a:avLst/>
             <a:gdLst>
-              <a:gd name="connsiteX0" fmla="*/ 0 w 2950108"/>
-              <a:gd name="connsiteY0" fmla="*/ 3150341 h 3150341"/>
-              <a:gd name="connsiteX1" fmla="*/ 1014517 w 2950108"/>
-              <a:gd name="connsiteY1" fmla="*/ 3150341 h 3150341"/>
-              <a:gd name="connsiteX2" fmla="*/ 1001168 w 2950108"/>
-              <a:gd name="connsiteY2" fmla="*/ 2369430 h 3150341"/>
-              <a:gd name="connsiteX3" fmla="*/ 1968964 w 2950108"/>
-              <a:gd name="connsiteY3" fmla="*/ 2369430 h 3150341"/>
-              <a:gd name="connsiteX4" fmla="*/ 1968964 w 2950108"/>
-              <a:gd name="connsiteY4" fmla="*/ 1641915 h 3150341"/>
-              <a:gd name="connsiteX5" fmla="*/ 2950108 w 2950108"/>
-              <a:gd name="connsiteY5" fmla="*/ 1641915 h 3150341"/>
-              <a:gd name="connsiteX6" fmla="*/ 2950108 w 2950108"/>
-              <a:gd name="connsiteY6" fmla="*/ 1641915 h 3150341"/>
-              <a:gd name="connsiteX7" fmla="*/ 2930085 w 2950108"/>
-              <a:gd name="connsiteY7" fmla="*/ 0 h 3150341"/>
+              <a:gd name="connsiteX0" fmla="*/ 0 w 4290646"/>
+              <a:gd name="connsiteY0" fmla="*/ 0 h 4466493"/>
+              <a:gd name="connsiteX1" fmla="*/ 0 w 4290646"/>
+              <a:gd name="connsiteY1" fmla="*/ 4466493 h 4466493"/>
+              <a:gd name="connsiteX2" fmla="*/ 1401745 w 4290646"/>
+              <a:gd name="connsiteY2" fmla="*/ 4466493 h 4466493"/>
+              <a:gd name="connsiteX3" fmla="*/ 1406769 w 4290646"/>
+              <a:gd name="connsiteY3" fmla="*/ 3320980 h 4466493"/>
+              <a:gd name="connsiteX4" fmla="*/ 2828611 w 4290646"/>
+              <a:gd name="connsiteY4" fmla="*/ 3320980 h 4466493"/>
+              <a:gd name="connsiteX5" fmla="*/ 2833635 w 4290646"/>
+              <a:gd name="connsiteY5" fmla="*/ 2220686 h 4466493"/>
+              <a:gd name="connsiteX6" fmla="*/ 4290646 w 4290646"/>
+              <a:gd name="connsiteY6" fmla="*/ 2220686 h 4466493"/>
+              <a:gd name="connsiteX7" fmla="*/ 4260501 w 4290646"/>
+              <a:gd name="connsiteY7" fmla="*/ 0 h 4466493"/>
+              <a:gd name="connsiteX8" fmla="*/ 0 w 4290646"/>
+              <a:gd name="connsiteY8" fmla="*/ 0 h 4466493"/>
             </a:gdLst>
             <a:ahLst/>
             <a:cxnLst>
@@ -3052,45 +3041,57 @@
               <a:cxn ang="0">
                 <a:pos x="connsiteX7" y="connsiteY7"/>
               </a:cxn>
+              <a:cxn ang="0">
+                <a:pos x="connsiteX8" y="connsiteY8"/>
+              </a:cxn>
             </a:cxnLst>
             <a:rect l="l" t="t" r="r" b="b"/>
             <a:pathLst>
-              <a:path w="2950108" h="3150341">
+              <a:path w="4290646" h="4466493">
                 <a:moveTo>
-                  <a:pt x="0" y="3150341"/>
+                  <a:pt x="0" y="0"/>
                 </a:moveTo>
                 <a:lnTo>
-                  <a:pt x="1014517" y="3150341"/>
+                  <a:pt x="0" y="4466493"/>
                 </a:lnTo>
                 <a:lnTo>
-                  <a:pt x="1001168" y="2369430"/>
+                  <a:pt x="1401745" y="4466493"/>
+                </a:lnTo>
+                <a:cubicBezTo>
+                  <a:pt x="1403420" y="4084655"/>
+                  <a:pt x="1405094" y="3702818"/>
+                  <a:pt x="1406769" y="3320980"/>
+                </a:cubicBezTo>
+                <a:lnTo>
+                  <a:pt x="2828611" y="3320980"/>
+                </a:lnTo>
+                <a:cubicBezTo>
+                  <a:pt x="2830286" y="2954215"/>
+                  <a:pt x="2831960" y="2587451"/>
+                  <a:pt x="2833635" y="2220686"/>
+                </a:cubicBezTo>
+                <a:lnTo>
+                  <a:pt x="4290646" y="2220686"/>
                 </a:lnTo>
                 <a:lnTo>
-                  <a:pt x="1968964" y="2369430"/>
+                  <a:pt x="4260501" y="0"/>
                 </a:lnTo>
                 <a:lnTo>
-                  <a:pt x="1968964" y="1641915"/>
+                  <a:pt x="0" y="0"/>
                 </a:lnTo>
-                <a:lnTo>
-                  <a:pt x="2950108" y="1641915"/>
-                </a:lnTo>
-                <a:lnTo>
-                  <a:pt x="2950108" y="1641915"/>
-                </a:lnTo>
-                <a:lnTo>
-                  <a:pt x="2930085" y="0"/>
-                </a:lnTo>
+                <a:close/>
               </a:path>
             </a:pathLst>
           </a:custGeom>
-          <a:noFill/>
-          <a:ln w="57150">
+          <a:solidFill>
+            <a:schemeClr val="bg2">
+              <a:alpha val="30000"/>
+            </a:schemeClr>
+          </a:solidFill>
+          <a:ln>
             <a:solidFill>
-              <a:schemeClr val="bg1">
-                <a:lumMod val="75000"/>
-              </a:schemeClr>
+              <a:schemeClr val="accent3"/>
             </a:solidFill>
-            <a:prstDash val="solid"/>
           </a:ln>
         </p:spPr>
         <p:style>
@@ -3114,16 +3115,34 @@
           <a:lstStyle/>
           <a:p>
             <a:pPr algn="ctr"/>
-            <a:endParaRPr lang="en-US">
-              <a:ln>
-                <a:solidFill>
-                  <a:schemeClr val="tx1"/>
-                </a:solidFill>
-              </a:ln>
-            </a:endParaRPr>
-          </a:p>
-        </p:txBody>
-      </p:sp>
+            <a:endParaRPr lang="en-US"/>
+          </a:p>
+        </p:txBody>
+      </p:sp>
+      <p:pic>
+        <p:nvPicPr>
+          <p:cNvPr id="2" name="Picture 1"/>
+          <p:cNvPicPr>
+            <a:picLocks noChangeAspect="1"/>
+          </p:cNvPicPr>
+          <p:nvPr/>
+        </p:nvPicPr>
+        <p:blipFill>
+          <a:blip r:embed="rId2"/>
+          <a:stretch>
+            <a:fillRect/>
+          </a:stretch>
+        </p:blipFill>
+        <p:spPr>
+          <a:xfrm>
+            <a:off x="562356" y="76200"/>
+            <a:ext cx="7918704" cy="6787461"/>
+          </a:xfrm>
+          <a:prstGeom prst="rect">
+            <a:avLst/>
+          </a:prstGeom>
+        </p:spPr>
+      </p:pic>
     </p:spTree>
     <p:extLst>
       <p:ext uri="{BB962C8B-B14F-4D97-AF65-F5344CB8AC3E}">

</xml_diff>